<commit_message>
Update final report to include docker solution
</commit_message>
<xml_diff>
--- a/projects/team_4/presentations/Final presentation.pptx
+++ b/projects/team_4/presentations/Final presentation.pptx
@@ -211,7 +211,7 @@
           <a:p>
             <a:fld id="{20083CCF-1A57-4B3C-AA8D-EDBFF79725AA}" type="datetimeFigureOut">
               <a:rPr lang="en-US" smtClean="0"/>
-              <a:t>6/4/2022</a:t>
+              <a:t>6/5/2022</a:t>
             </a:fld>
             <a:endParaRPr lang="en-US"/>
           </a:p>
@@ -1060,7 +1060,7 @@
           <a:p>
             <a:fld id="{76969C88-B244-455D-A017-012B25B1ACDD}" type="datetimeFigureOut">
               <a:rPr lang="en-US" smtClean="0"/>
-              <a:t>6/4/2022</a:t>
+              <a:t>6/5/2022</a:t>
             </a:fld>
             <a:endParaRPr lang="en-US"/>
           </a:p>
@@ -1258,7 +1258,7 @@
           <a:p>
             <a:fld id="{76969C88-B244-455D-A017-012B25B1ACDD}" type="datetimeFigureOut">
               <a:rPr lang="en-US" smtClean="0"/>
-              <a:t>6/4/2022</a:t>
+              <a:t>6/5/2022</a:t>
             </a:fld>
             <a:endParaRPr lang="en-US"/>
           </a:p>
@@ -1466,7 +1466,7 @@
           <a:p>
             <a:fld id="{76969C88-B244-455D-A017-012B25B1ACDD}" type="datetimeFigureOut">
               <a:rPr lang="en-US" smtClean="0"/>
-              <a:t>6/4/2022</a:t>
+              <a:t>6/5/2022</a:t>
             </a:fld>
             <a:endParaRPr lang="en-US"/>
           </a:p>
@@ -1664,7 +1664,7 @@
           <a:p>
             <a:fld id="{76969C88-B244-455D-A017-012B25B1ACDD}" type="datetimeFigureOut">
               <a:rPr lang="en-US" smtClean="0"/>
-              <a:t>6/4/2022</a:t>
+              <a:t>6/5/2022</a:t>
             </a:fld>
             <a:endParaRPr lang="en-US"/>
           </a:p>
@@ -1939,7 +1939,7 @@
           <a:p>
             <a:fld id="{76969C88-B244-455D-A017-012B25B1ACDD}" type="datetimeFigureOut">
               <a:rPr lang="en-US" smtClean="0"/>
-              <a:t>6/4/2022</a:t>
+              <a:t>6/5/2022</a:t>
             </a:fld>
             <a:endParaRPr lang="en-US"/>
           </a:p>
@@ -2204,7 +2204,7 @@
           <a:p>
             <a:fld id="{76969C88-B244-455D-A017-012B25B1ACDD}" type="datetimeFigureOut">
               <a:rPr lang="en-US" smtClean="0"/>
-              <a:t>6/4/2022</a:t>
+              <a:t>6/5/2022</a:t>
             </a:fld>
             <a:endParaRPr lang="en-US"/>
           </a:p>
@@ -2616,7 +2616,7 @@
           <a:p>
             <a:fld id="{76969C88-B244-455D-A017-012B25B1ACDD}" type="datetimeFigureOut">
               <a:rPr lang="en-US" smtClean="0"/>
-              <a:t>6/4/2022</a:t>
+              <a:t>6/5/2022</a:t>
             </a:fld>
             <a:endParaRPr lang="en-US"/>
           </a:p>
@@ -2757,7 +2757,7 @@
           <a:p>
             <a:fld id="{76969C88-B244-455D-A017-012B25B1ACDD}" type="datetimeFigureOut">
               <a:rPr lang="en-US" smtClean="0"/>
-              <a:t>6/4/2022</a:t>
+              <a:t>6/5/2022</a:t>
             </a:fld>
             <a:endParaRPr lang="en-US"/>
           </a:p>
@@ -2870,7 +2870,7 @@
           <a:p>
             <a:fld id="{76969C88-B244-455D-A017-012B25B1ACDD}" type="datetimeFigureOut">
               <a:rPr lang="en-US" smtClean="0"/>
-              <a:t>6/4/2022</a:t>
+              <a:t>6/5/2022</a:t>
             </a:fld>
             <a:endParaRPr lang="en-US"/>
           </a:p>
@@ -3181,7 +3181,7 @@
           <a:p>
             <a:fld id="{76969C88-B244-455D-A017-012B25B1ACDD}" type="datetimeFigureOut">
               <a:rPr lang="en-US" smtClean="0"/>
-              <a:t>6/4/2022</a:t>
+              <a:t>6/5/2022</a:t>
             </a:fld>
             <a:endParaRPr lang="en-US"/>
           </a:p>
@@ -3472,7 +3472,7 @@
           <a:p>
             <a:fld id="{76969C88-B244-455D-A017-012B25B1ACDD}" type="datetimeFigureOut">
               <a:rPr lang="en-US" smtClean="0"/>
-              <a:t>6/4/2022</a:t>
+              <a:t>6/5/2022</a:t>
             </a:fld>
             <a:endParaRPr lang="en-US"/>
           </a:p>
@@ -4226,7 +4226,7 @@
             <a:fld id="{76969C88-B244-455D-A017-012B25B1ACDD}" type="datetimeFigureOut">
               <a:rPr lang="en-US" smtClean="0"/>
               <a:pPr/>
-              <a:t>6/4/2022</a:t>
+              <a:t>6/5/2022</a:t>
             </a:fld>
             <a:endParaRPr lang="en-US"/>
           </a:p>
@@ -11631,15 +11631,6 @@
 </file>
 
 <file path=customXml/item1.xml><?xml version="1.0" encoding="utf-8"?>
-<?mso-contentType ?>
-<FormTemplates xmlns="http://schemas.microsoft.com/sharepoint/v3/contenttype/forms">
-  <Display>DocumentLibraryForm</Display>
-  <Edit>DocumentLibraryForm</Edit>
-  <New>DocumentLibraryForm</New>
-</FormTemplates>
-</file>
-
-<file path=customXml/item2.xml><?xml version="1.0" encoding="utf-8"?>
 <ct:contentTypeSchema xmlns:ct="http://schemas.microsoft.com/office/2006/metadata/contentType" xmlns:ma="http://schemas.microsoft.com/office/2006/metadata/properties/metaAttributes" ct:_="" ma:_="" ma:contentTypeName="Dokument" ma:contentTypeID="0x01010048C0C21177106A4C92C1293ACB7E15D1" ma:contentTypeVersion="12" ma:contentTypeDescription="Utwórz nowy dokument." ma:contentTypeScope="" ma:versionID="71100b0debc5f424762bd320aeb9e18b">
   <xsd:schema xmlns:xsd="http://www.w3.org/2001/XMLSchema" xmlns:xs="http://www.w3.org/2001/XMLSchema" xmlns:p="http://schemas.microsoft.com/office/2006/metadata/properties" xmlns:ns3="71f0ca6d-ff23-40b9-82ff-190e9f68712f" xmlns:ns4="a211d0e6-8592-4b74-85d9-77383723e577" targetNamespace="http://schemas.microsoft.com/office/2006/metadata/properties" ma:root="true" ma:fieldsID="eda19b4d6a625a2d0df6f2dea061f308" ns3:_="" ns4:_="">
     <xsd:import namespace="71f0ca6d-ff23-40b9-82ff-190e9f68712f"/>
@@ -11856,6 +11847,15 @@
 </ct:contentTypeSchema>
 </file>
 
+<file path=customXml/item2.xml><?xml version="1.0" encoding="utf-8"?>
+<?mso-contentType ?>
+<FormTemplates xmlns="http://schemas.microsoft.com/sharepoint/v3/contenttype/forms">
+  <Display>DocumentLibraryForm</Display>
+  <Edit>DocumentLibraryForm</Edit>
+  <New>DocumentLibraryForm</New>
+</FormTemplates>
+</file>
+
 <file path=customXml/item3.xml><?xml version="1.0" encoding="utf-8"?>
 <p:properties xmlns:p="http://schemas.microsoft.com/office/2006/metadata/properties" xmlns:xsi="http://www.w3.org/2001/XMLSchema-instance" xmlns:pc="http://schemas.microsoft.com/office/infopath/2007/PartnerControls">
   <documentManagement/>
@@ -11863,14 +11863,6 @@
 </file>
 
 <file path=customXml/itemProps1.xml><?xml version="1.0" encoding="utf-8"?>
-<ds:datastoreItem xmlns:ds="http://schemas.openxmlformats.org/officeDocument/2006/customXml" ds:itemID="{F0CE8665-0BE3-4F78-89B9-B6320FCCFD6A}">
-  <ds:schemaRefs>
-    <ds:schemaRef ds:uri="http://schemas.microsoft.com/sharepoint/v3/contenttype/forms"/>
-  </ds:schemaRefs>
-</ds:datastoreItem>
-</file>
-
-<file path=customXml/itemProps2.xml><?xml version="1.0" encoding="utf-8"?>
 <ds:datastoreItem xmlns:ds="http://schemas.openxmlformats.org/officeDocument/2006/customXml" ds:itemID="{9AC7A8C9-C330-454F-BF01-E434D499A882}">
   <ds:schemaRefs>
     <ds:schemaRef ds:uri="71f0ca6d-ff23-40b9-82ff-190e9f68712f"/>
@@ -11885,6 +11877,14 @@
     <ds:schemaRef ds:uri="http://schemas.microsoft.com/office/infopath/2007/PartnerControls"/>
     <ds:schemaRef ds:uri="http://schemas.openxmlformats.org/package/2006/metadata/core-properties"/>
     <ds:schemaRef ds:uri="http://www.w3.org/2001/XMLSchema"/>
+  </ds:schemaRefs>
+</ds:datastoreItem>
+</file>
+
+<file path=customXml/itemProps2.xml><?xml version="1.0" encoding="utf-8"?>
+<ds:datastoreItem xmlns:ds="http://schemas.openxmlformats.org/officeDocument/2006/customXml" ds:itemID="{F0CE8665-0BE3-4F78-89B9-B6320FCCFD6A}">
+  <ds:schemaRefs>
+    <ds:schemaRef ds:uri="http://schemas.microsoft.com/sharepoint/v3/contenttype/forms"/>
   </ds:schemaRefs>
 </ds:datastoreItem>
 </file>

</xml_diff>